<commit_message>
Finalize L1 for real
</commit_message>
<xml_diff>
--- a/Lecture01_Introduction/L1Slides_DemandforHealth_2023W.pptx
+++ b/Lecture01_Introduction/L1Slides_DemandforHealth_2023W.pptx
@@ -1453,7 +1453,7 @@
           <a:p>
             <a:fld id="{EF911157-0FC2-4F06-8D61-FD647FE4E19D}" type="datetimeFigureOut">
               <a:rPr lang="en-US" smtClean="0"/>
-              <a:t>1/10/2023</a:t>
+              <a:t>1/11/2023</a:t>
             </a:fld>
             <a:endParaRPr lang="en-US"/>
           </a:p>
@@ -1775,8 +1775,21 @@
             </a:pPr>
             <a:r>
               <a:rPr lang="en-US" dirty="0"/>
-              <a:t>Update syllabus</a:t>
-            </a:r>
+              <a:t>Update syllabus. To add for next time – how does Grossman model vary </a:t>
+            </a:r>
+            <a:r>
+              <a:rPr lang="en-US" dirty="0" err="1"/>
+              <a:t>preditions</a:t>
+            </a:r>
+            <a:r>
+              <a:rPr lang="en-US" dirty="0"/>
+              <a:t> over </a:t>
+            </a:r>
+            <a:r>
+              <a:rPr lang="en-US"/>
+              <a:t>the life-cycle?</a:t>
+            </a:r>
+            <a:endParaRPr lang="en-US" dirty="0"/>
           </a:p>
         </p:txBody>
       </p:sp>
@@ -4803,7 +4816,7 @@
           <a:p>
             <a:r>
               <a:rPr lang="en-CA" dirty="0"/>
-              <a:t>The change in H in each period is the investment in each period minus depreciation (at rate \delta). This treats health as a durable good, part of human capital.</a:t>
+              <a:t>The change in H in each period is the investment in each period minus depreciation (at rate \delta). This treats health as a durable good, part of human capital. One way to get varying predictions over life-cycle—let delta be a function of age. </a:t>
             </a:r>
           </a:p>
         </p:txBody>
@@ -5331,9 +5344,14 @@
           <a:bodyPr/>
           <a:lstStyle/>
           <a:p>
-            <a:endParaRPr lang="en-CA" dirty="0"/>
-          </a:p>
-          <a:p>
+            <a:r>
+              <a:rPr lang="en-CA" dirty="0"/>
+              <a:t>Also note that as a person gets sicker, the PPF </a:t>
+            </a:r>
+            <a:r>
+              <a:rPr lang="en-CA"/>
+              <a:t>shrinks inward (or at least, to the left0</a:t>
+            </a:r>
             <a:endParaRPr lang="en-CA" dirty="0"/>
           </a:p>
         </p:txBody>
@@ -5789,7 +5807,7 @@
           <a:p>
             <a:r>
               <a:rPr lang="en-CA" dirty="0"/>
-              <a:t>Changes in wages over time, completely forward-looking decision-making (this is the biggest drawback in my book), no uncertainty.</a:t>
+              <a:t>Changes in wages over time, completely forward-looking decision-making (this is the biggest drawback in my book), no uncertainty. Talk a little bit more about how to use he model to look at variations across individuals but also across time (aging)</a:t>
             </a:r>
           </a:p>
         </p:txBody>
@@ -7878,7 +7896,7 @@
             <a:fld id="{0972D05C-DCFB-4BB6-B49C-AC126BF3ED2C}" type="datetimeFigureOut">
               <a:rPr lang="en-US" smtClean="0"/>
               <a:pPr/>
-              <a:t>1/10/2023</a:t>
+              <a:t>1/11/2023</a:t>
             </a:fld>
             <a:endParaRPr lang="en-US"/>
           </a:p>
@@ -8108,7 +8126,7 @@
             <a:fld id="{0972D05C-DCFB-4BB6-B49C-AC126BF3ED2C}" type="datetimeFigureOut">
               <a:rPr lang="en-US" smtClean="0"/>
               <a:pPr/>
-              <a:t>1/10/2023</a:t>
+              <a:t>1/11/2023</a:t>
             </a:fld>
             <a:endParaRPr lang="en-US"/>
           </a:p>
@@ -8290,7 +8308,7 @@
             <a:fld id="{0972D05C-DCFB-4BB6-B49C-AC126BF3ED2C}" type="datetimeFigureOut">
               <a:rPr lang="en-US" smtClean="0"/>
               <a:pPr/>
-              <a:t>1/10/2023</a:t>
+              <a:t>1/11/2023</a:t>
             </a:fld>
             <a:endParaRPr lang="en-US"/>
           </a:p>
@@ -8462,7 +8480,7 @@
             <a:fld id="{0972D05C-DCFB-4BB6-B49C-AC126BF3ED2C}" type="datetimeFigureOut">
               <a:rPr lang="en-US" smtClean="0"/>
               <a:pPr/>
-              <a:t>1/10/2023</a:t>
+              <a:t>1/11/2023</a:t>
             </a:fld>
             <a:endParaRPr lang="en-US"/>
           </a:p>
@@ -8718,7 +8736,7 @@
             <a:fld id="{0972D05C-DCFB-4BB6-B49C-AC126BF3ED2C}" type="datetimeFigureOut">
               <a:rPr lang="en-US" smtClean="0"/>
               <a:pPr/>
-              <a:t>1/10/2023</a:t>
+              <a:t>1/11/2023</a:t>
             </a:fld>
             <a:endParaRPr lang="en-US"/>
           </a:p>
@@ -9046,7 +9064,7 @@
             <a:fld id="{0972D05C-DCFB-4BB6-B49C-AC126BF3ED2C}" type="datetimeFigureOut">
               <a:rPr lang="en-US" smtClean="0"/>
               <a:pPr/>
-              <a:t>1/10/2023</a:t>
+              <a:t>1/11/2023</a:t>
             </a:fld>
             <a:endParaRPr lang="en-US"/>
           </a:p>
@@ -9499,7 +9517,7 @@
             <a:fld id="{0972D05C-DCFB-4BB6-B49C-AC126BF3ED2C}" type="datetimeFigureOut">
               <a:rPr lang="en-US" smtClean="0"/>
               <a:pPr/>
-              <a:t>1/10/2023</a:t>
+              <a:t>1/11/2023</a:t>
             </a:fld>
             <a:endParaRPr lang="en-US"/>
           </a:p>
@@ -9619,7 +9637,7 @@
             <a:fld id="{0972D05C-DCFB-4BB6-B49C-AC126BF3ED2C}" type="datetimeFigureOut">
               <a:rPr lang="en-US" smtClean="0"/>
               <a:pPr/>
-              <a:t>1/10/2023</a:t>
+              <a:t>1/11/2023</a:t>
             </a:fld>
             <a:endParaRPr lang="en-US"/>
           </a:p>
@@ -9716,7 +9734,7 @@
             <a:fld id="{0972D05C-DCFB-4BB6-B49C-AC126BF3ED2C}" type="datetimeFigureOut">
               <a:rPr lang="en-US" smtClean="0"/>
               <a:pPr/>
-              <a:t>1/10/2023</a:t>
+              <a:t>1/11/2023</a:t>
             </a:fld>
             <a:endParaRPr lang="en-US"/>
           </a:p>
@@ -10005,7 +10023,7 @@
             <a:fld id="{0972D05C-DCFB-4BB6-B49C-AC126BF3ED2C}" type="datetimeFigureOut">
               <a:rPr lang="en-US" smtClean="0"/>
               <a:pPr/>
-              <a:t>1/10/2023</a:t>
+              <a:t>1/11/2023</a:t>
             </a:fld>
             <a:endParaRPr lang="en-US"/>
           </a:p>
@@ -10329,7 +10347,7 @@
             <a:fld id="{0972D05C-DCFB-4BB6-B49C-AC126BF3ED2C}" type="datetimeFigureOut">
               <a:rPr lang="en-US" smtClean="0"/>
               <a:pPr/>
-              <a:t>1/10/2023</a:t>
+              <a:t>1/11/2023</a:t>
             </a:fld>
             <a:endParaRPr lang="en-US"/>
           </a:p>
@@ -10584,7 +10602,7 @@
             <a:fld id="{0972D05C-DCFB-4BB6-B49C-AC126BF3ED2C}" type="datetimeFigureOut">
               <a:rPr lang="en-US" smtClean="0"/>
               <a:pPr/>
-              <a:t>1/10/2023</a:t>
+              <a:t>1/11/2023</a:t>
             </a:fld>
             <a:endParaRPr lang="en-US" dirty="0"/>
           </a:p>
@@ -21687,8 +21705,8 @@
           </a:p>
         </p:txBody>
       </p:sp>
-      <mc:AlternateContent xmlns:mc="http://schemas.openxmlformats.org/markup-compatibility/2006">
-        <mc:Choice xmlns:a14="http://schemas.microsoft.com/office/drawing/2010/main" Requires="a14">
+      <mc:AlternateContent xmlns:mc="http://schemas.openxmlformats.org/markup-compatibility/2006" xmlns:a14="http://schemas.microsoft.com/office/drawing/2010/main">
+        <mc:Choice Requires="a14">
           <p:sp>
             <p:nvSpPr>
               <p:cNvPr id="2" name="TextBox 1">
@@ -22341,7 +22359,7 @@
             </p:txBody>
           </p:sp>
         </mc:Choice>
-        <mc:Fallback>
+        <mc:Fallback xmlns="">
           <p:sp>
             <p:nvSpPr>
               <p:cNvPr id="2" name="TextBox 1">
@@ -29125,8 +29143,8 @@
           </a:p>
         </p:txBody>
       </p:sp>
-      <mc:AlternateContent xmlns:mc="http://schemas.openxmlformats.org/markup-compatibility/2006">
-        <mc:Choice xmlns:a14="http://schemas.microsoft.com/office/drawing/2010/main" Requires="a14">
+      <mc:AlternateContent xmlns:mc="http://schemas.openxmlformats.org/markup-compatibility/2006" xmlns:a14="http://schemas.microsoft.com/office/drawing/2010/main">
+        <mc:Choice Requires="a14">
           <p:sp>
             <p:nvSpPr>
               <p:cNvPr id="3" name="TextBox 2">
@@ -29410,7 +29428,7 @@
             </p:txBody>
           </p:sp>
         </mc:Choice>
-        <mc:Fallback>
+        <mc:Fallback xmlns="">
           <p:sp>
             <p:nvSpPr>
               <p:cNvPr id="3" name="TextBox 2">
@@ -29588,8 +29606,8 @@
           </a:p>
         </p:txBody>
       </p:sp>
-      <mc:AlternateContent xmlns:mc="http://schemas.openxmlformats.org/markup-compatibility/2006">
-        <mc:Choice xmlns:a14="http://schemas.microsoft.com/office/drawing/2010/main" Requires="a14">
+      <mc:AlternateContent xmlns:mc="http://schemas.openxmlformats.org/markup-compatibility/2006" xmlns:a14="http://schemas.microsoft.com/office/drawing/2010/main">
+        <mc:Choice Requires="a14">
           <p:sp>
             <p:nvSpPr>
               <p:cNvPr id="2" name="TextBox 1">
@@ -29736,7 +29754,7 @@
             </p:txBody>
           </p:sp>
         </mc:Choice>
-        <mc:Fallback>
+        <mc:Fallback xmlns="">
           <p:sp>
             <p:nvSpPr>
               <p:cNvPr id="2" name="TextBox 1">
@@ -30376,8 +30394,8 @@
           </a:p>
         </p:txBody>
       </p:sp>
-      <mc:AlternateContent xmlns:mc="http://schemas.openxmlformats.org/markup-compatibility/2006">
-        <mc:Choice xmlns:a14="http://schemas.microsoft.com/office/drawing/2010/main" Requires="a14">
+      <mc:AlternateContent xmlns:mc="http://schemas.openxmlformats.org/markup-compatibility/2006" xmlns:a14="http://schemas.microsoft.com/office/drawing/2010/main">
+        <mc:Choice Requires="a14">
           <p:sp>
             <p:nvSpPr>
               <p:cNvPr id="2" name="TextBox 1">
@@ -30804,7 +30822,7 @@
             </p:txBody>
           </p:sp>
         </mc:Choice>
-        <mc:Fallback>
+        <mc:Fallback xmlns="">
           <p:sp>
             <p:nvSpPr>
               <p:cNvPr id="2" name="TextBox 1">
@@ -35096,8 +35114,8 @@
           </a:p>
         </p:txBody>
       </p:sp>
-      <mc:AlternateContent xmlns:mc="http://schemas.openxmlformats.org/markup-compatibility/2006">
-        <mc:Choice xmlns:a14="http://schemas.microsoft.com/office/drawing/2010/main" Requires="a14">
+      <mc:AlternateContent xmlns:mc="http://schemas.openxmlformats.org/markup-compatibility/2006" xmlns:a14="http://schemas.microsoft.com/office/drawing/2010/main">
+        <mc:Choice Requires="a14">
           <p:sp>
             <p:nvSpPr>
               <p:cNvPr id="2" name="TextBox 1">
@@ -35872,7 +35890,7 @@
             </p:txBody>
           </p:sp>
         </mc:Choice>
-        <mc:Fallback>
+        <mc:Fallback xmlns="">
           <p:sp>
             <p:nvSpPr>
               <p:cNvPr id="2" name="TextBox 1">
@@ -36038,8 +36056,8 @@
           </a:p>
         </p:txBody>
       </p:sp>
-      <mc:AlternateContent xmlns:mc="http://schemas.openxmlformats.org/markup-compatibility/2006">
-        <mc:Choice xmlns:a14="http://schemas.microsoft.com/office/drawing/2010/main" Requires="a14">
+      <mc:AlternateContent xmlns:mc="http://schemas.openxmlformats.org/markup-compatibility/2006" xmlns:a14="http://schemas.microsoft.com/office/drawing/2010/main">
+        <mc:Choice Requires="a14">
           <p:sp>
             <p:nvSpPr>
               <p:cNvPr id="2" name="TextBox 1">
@@ -37026,7 +37044,7 @@
             </p:txBody>
           </p:sp>
         </mc:Choice>
-        <mc:Fallback>
+        <mc:Fallback xmlns="">
           <p:sp>
             <p:nvSpPr>
               <p:cNvPr id="2" name="TextBox 1">

</xml_diff>

<commit_message>
Finalize L2, add referee report templates
</commit_message>
<xml_diff>
--- a/Lecture01_Introduction/L1Slides_DemandforHealth_2023W.pptx
+++ b/Lecture01_Introduction/L1Slides_DemandforHealth_2023W.pptx
@@ -1453,7 +1453,7 @@
           <a:p>
             <a:fld id="{EF911157-0FC2-4F06-8D61-FD647FE4E19D}" type="datetimeFigureOut">
               <a:rPr lang="en-US" smtClean="0"/>
-              <a:t>1/11/2023</a:t>
+              <a:t>1/16/2023</a:t>
             </a:fld>
             <a:endParaRPr lang="en-US"/>
           </a:p>
@@ -1783,13 +1783,8 @@
             </a:r>
             <a:r>
               <a:rPr lang="en-US" dirty="0"/>
-              <a:t> over </a:t>
-            </a:r>
-            <a:r>
-              <a:rPr lang="en-US"/>
-              <a:t>the life-cycle?</a:t>
-            </a:r>
-            <a:endParaRPr lang="en-US" dirty="0"/>
+              <a:t> over the life-cycle? Slides were a little bit long (didn’t get to discussion on model) and the integral was surprising to students – walk through it more. </a:t>
+            </a:r>
           </a:p>
         </p:txBody>
       </p:sp>
@@ -7896,7 +7891,7 @@
             <a:fld id="{0972D05C-DCFB-4BB6-B49C-AC126BF3ED2C}" type="datetimeFigureOut">
               <a:rPr lang="en-US" smtClean="0"/>
               <a:pPr/>
-              <a:t>1/11/2023</a:t>
+              <a:t>1/16/2023</a:t>
             </a:fld>
             <a:endParaRPr lang="en-US"/>
           </a:p>
@@ -8126,7 +8121,7 @@
             <a:fld id="{0972D05C-DCFB-4BB6-B49C-AC126BF3ED2C}" type="datetimeFigureOut">
               <a:rPr lang="en-US" smtClean="0"/>
               <a:pPr/>
-              <a:t>1/11/2023</a:t>
+              <a:t>1/16/2023</a:t>
             </a:fld>
             <a:endParaRPr lang="en-US"/>
           </a:p>
@@ -8308,7 +8303,7 @@
             <a:fld id="{0972D05C-DCFB-4BB6-B49C-AC126BF3ED2C}" type="datetimeFigureOut">
               <a:rPr lang="en-US" smtClean="0"/>
               <a:pPr/>
-              <a:t>1/11/2023</a:t>
+              <a:t>1/16/2023</a:t>
             </a:fld>
             <a:endParaRPr lang="en-US"/>
           </a:p>
@@ -8480,7 +8475,7 @@
             <a:fld id="{0972D05C-DCFB-4BB6-B49C-AC126BF3ED2C}" type="datetimeFigureOut">
               <a:rPr lang="en-US" smtClean="0"/>
               <a:pPr/>
-              <a:t>1/11/2023</a:t>
+              <a:t>1/16/2023</a:t>
             </a:fld>
             <a:endParaRPr lang="en-US"/>
           </a:p>
@@ -8736,7 +8731,7 @@
             <a:fld id="{0972D05C-DCFB-4BB6-B49C-AC126BF3ED2C}" type="datetimeFigureOut">
               <a:rPr lang="en-US" smtClean="0"/>
               <a:pPr/>
-              <a:t>1/11/2023</a:t>
+              <a:t>1/16/2023</a:t>
             </a:fld>
             <a:endParaRPr lang="en-US"/>
           </a:p>
@@ -9064,7 +9059,7 @@
             <a:fld id="{0972D05C-DCFB-4BB6-B49C-AC126BF3ED2C}" type="datetimeFigureOut">
               <a:rPr lang="en-US" smtClean="0"/>
               <a:pPr/>
-              <a:t>1/11/2023</a:t>
+              <a:t>1/16/2023</a:t>
             </a:fld>
             <a:endParaRPr lang="en-US"/>
           </a:p>
@@ -9517,7 +9512,7 @@
             <a:fld id="{0972D05C-DCFB-4BB6-B49C-AC126BF3ED2C}" type="datetimeFigureOut">
               <a:rPr lang="en-US" smtClean="0"/>
               <a:pPr/>
-              <a:t>1/11/2023</a:t>
+              <a:t>1/16/2023</a:t>
             </a:fld>
             <a:endParaRPr lang="en-US"/>
           </a:p>
@@ -9637,7 +9632,7 @@
             <a:fld id="{0972D05C-DCFB-4BB6-B49C-AC126BF3ED2C}" type="datetimeFigureOut">
               <a:rPr lang="en-US" smtClean="0"/>
               <a:pPr/>
-              <a:t>1/11/2023</a:t>
+              <a:t>1/16/2023</a:t>
             </a:fld>
             <a:endParaRPr lang="en-US"/>
           </a:p>
@@ -9734,7 +9729,7 @@
             <a:fld id="{0972D05C-DCFB-4BB6-B49C-AC126BF3ED2C}" type="datetimeFigureOut">
               <a:rPr lang="en-US" smtClean="0"/>
               <a:pPr/>
-              <a:t>1/11/2023</a:t>
+              <a:t>1/16/2023</a:t>
             </a:fld>
             <a:endParaRPr lang="en-US"/>
           </a:p>
@@ -10023,7 +10018,7 @@
             <a:fld id="{0972D05C-DCFB-4BB6-B49C-AC126BF3ED2C}" type="datetimeFigureOut">
               <a:rPr lang="en-US" smtClean="0"/>
               <a:pPr/>
-              <a:t>1/11/2023</a:t>
+              <a:t>1/16/2023</a:t>
             </a:fld>
             <a:endParaRPr lang="en-US"/>
           </a:p>
@@ -10347,7 +10342,7 @@
             <a:fld id="{0972D05C-DCFB-4BB6-B49C-AC126BF3ED2C}" type="datetimeFigureOut">
               <a:rPr lang="en-US" smtClean="0"/>
               <a:pPr/>
-              <a:t>1/11/2023</a:t>
+              <a:t>1/16/2023</a:t>
             </a:fld>
             <a:endParaRPr lang="en-US"/>
           </a:p>
@@ -10602,7 +10597,7 @@
             <a:fld id="{0972D05C-DCFB-4BB6-B49C-AC126BF3ED2C}" type="datetimeFigureOut">
               <a:rPr lang="en-US" smtClean="0"/>
               <a:pPr/>
-              <a:t>1/11/2023</a:t>
+              <a:t>1/16/2023</a:t>
             </a:fld>
             <a:endParaRPr lang="en-US" dirty="0"/>
           </a:p>

</xml_diff>